<commit_message>
mod readme for banner, badge
</commit_message>
<xml_diff>
--- a/assets/banner-design.pptx
+++ b/assets/banner-design.pptx
@@ -105,6 +105,11 @@
       </a:defRPr>
     </a:lvl9pPr>
   </p:defaultTextStyle>
+  <p:extLst>
+    <p:ext uri="{EFAFB233-063F-42B5-8137-9DF3F51BA10A}">
+      <p15:sldGuideLst xmlns:p15="http://schemas.microsoft.com/office/powerpoint/2012/main"/>
+    </p:ext>
+  </p:extLst>
 </p:presentation>
 </file>
 
@@ -255,7 +260,7 @@
           <a:p>
             <a:fld id="{CE428E85-C471-4A0A-ACB0-7352606E9055}" type="datetimeFigureOut">
               <a:rPr lang="ko-KR" altLang="en-US" smtClean="0"/>
-              <a:t>2022-09-05</a:t>
+              <a:t>2022-09-06</a:t>
             </a:fld>
             <a:endParaRPr lang="ko-KR" altLang="en-US"/>
           </a:p>
@@ -453,7 +458,7 @@
           <a:p>
             <a:fld id="{CE428E85-C471-4A0A-ACB0-7352606E9055}" type="datetimeFigureOut">
               <a:rPr lang="ko-KR" altLang="en-US" smtClean="0"/>
-              <a:t>2022-09-05</a:t>
+              <a:t>2022-09-06</a:t>
             </a:fld>
             <a:endParaRPr lang="ko-KR" altLang="en-US"/>
           </a:p>
@@ -661,7 +666,7 @@
           <a:p>
             <a:fld id="{CE428E85-C471-4A0A-ACB0-7352606E9055}" type="datetimeFigureOut">
               <a:rPr lang="ko-KR" altLang="en-US" smtClean="0"/>
-              <a:t>2022-09-05</a:t>
+              <a:t>2022-09-06</a:t>
             </a:fld>
             <a:endParaRPr lang="ko-KR" altLang="en-US"/>
           </a:p>
@@ -859,7 +864,7 @@
           <a:p>
             <a:fld id="{CE428E85-C471-4A0A-ACB0-7352606E9055}" type="datetimeFigureOut">
               <a:rPr lang="ko-KR" altLang="en-US" smtClean="0"/>
-              <a:t>2022-09-05</a:t>
+              <a:t>2022-09-06</a:t>
             </a:fld>
             <a:endParaRPr lang="ko-KR" altLang="en-US"/>
           </a:p>
@@ -1134,7 +1139,7 @@
           <a:p>
             <a:fld id="{CE428E85-C471-4A0A-ACB0-7352606E9055}" type="datetimeFigureOut">
               <a:rPr lang="ko-KR" altLang="en-US" smtClean="0"/>
-              <a:t>2022-09-05</a:t>
+              <a:t>2022-09-06</a:t>
             </a:fld>
             <a:endParaRPr lang="ko-KR" altLang="en-US"/>
           </a:p>
@@ -1399,7 +1404,7 @@
           <a:p>
             <a:fld id="{CE428E85-C471-4A0A-ACB0-7352606E9055}" type="datetimeFigureOut">
               <a:rPr lang="ko-KR" altLang="en-US" smtClean="0"/>
-              <a:t>2022-09-05</a:t>
+              <a:t>2022-09-06</a:t>
             </a:fld>
             <a:endParaRPr lang="ko-KR" altLang="en-US"/>
           </a:p>
@@ -1811,7 +1816,7 @@
           <a:p>
             <a:fld id="{CE428E85-C471-4A0A-ACB0-7352606E9055}" type="datetimeFigureOut">
               <a:rPr lang="ko-KR" altLang="en-US" smtClean="0"/>
-              <a:t>2022-09-05</a:t>
+              <a:t>2022-09-06</a:t>
             </a:fld>
             <a:endParaRPr lang="ko-KR" altLang="en-US"/>
           </a:p>
@@ -1952,7 +1957,7 @@
           <a:p>
             <a:fld id="{CE428E85-C471-4A0A-ACB0-7352606E9055}" type="datetimeFigureOut">
               <a:rPr lang="ko-KR" altLang="en-US" smtClean="0"/>
-              <a:t>2022-09-05</a:t>
+              <a:t>2022-09-06</a:t>
             </a:fld>
             <a:endParaRPr lang="ko-KR" altLang="en-US"/>
           </a:p>
@@ -2065,7 +2070,7 @@
           <a:p>
             <a:fld id="{CE428E85-C471-4A0A-ACB0-7352606E9055}" type="datetimeFigureOut">
               <a:rPr lang="ko-KR" altLang="en-US" smtClean="0"/>
-              <a:t>2022-09-05</a:t>
+              <a:t>2022-09-06</a:t>
             </a:fld>
             <a:endParaRPr lang="ko-KR" altLang="en-US"/>
           </a:p>
@@ -2376,7 +2381,7 @@
           <a:p>
             <a:fld id="{CE428E85-C471-4A0A-ACB0-7352606E9055}" type="datetimeFigureOut">
               <a:rPr lang="ko-KR" altLang="en-US" smtClean="0"/>
-              <a:t>2022-09-05</a:t>
+              <a:t>2022-09-06</a:t>
             </a:fld>
             <a:endParaRPr lang="ko-KR" altLang="en-US"/>
           </a:p>
@@ -2664,7 +2669,7 @@
           <a:p>
             <a:fld id="{CE428E85-C471-4A0A-ACB0-7352606E9055}" type="datetimeFigureOut">
               <a:rPr lang="ko-KR" altLang="en-US" smtClean="0"/>
-              <a:t>2022-09-05</a:t>
+              <a:t>2022-09-06</a:t>
             </a:fld>
             <a:endParaRPr lang="ko-KR" altLang="en-US"/>
           </a:p>
@@ -2905,7 +2910,7 @@
           <a:p>
             <a:fld id="{CE428E85-C471-4A0A-ACB0-7352606E9055}" type="datetimeFigureOut">
               <a:rPr lang="ko-KR" altLang="en-US" smtClean="0"/>
-              <a:t>2022-09-05</a:t>
+              <a:t>2022-09-06</a:t>
             </a:fld>
             <a:endParaRPr lang="ko-KR" altLang="en-US"/>
           </a:p>
@@ -3606,10 +3611,10 @@
       </p:grpSpPr>
       <p:grpSp>
         <p:nvGrpSpPr>
-          <p:cNvPr id="45" name="그룹 44">
-            <a:extLst>
-              <a:ext uri="{FF2B5EF4-FFF2-40B4-BE49-F238E27FC236}">
-                <a16:creationId xmlns:a16="http://schemas.microsoft.com/office/drawing/2014/main" id="{AFD265F9-338C-D481-2893-BCF454743137}"/>
+          <p:cNvPr id="9" name="그룹 8">
+            <a:extLst>
+              <a:ext uri="{FF2B5EF4-FFF2-40B4-BE49-F238E27FC236}">
+                <a16:creationId xmlns:a16="http://schemas.microsoft.com/office/drawing/2014/main" id="{A22BC1E4-1668-56AD-3A07-23A4A9F3BD70}"/>
               </a:ext>
             </a:extLst>
           </p:cNvPr>
@@ -3745,8 +3750,8 @@
           </p:nvSpPr>
           <p:spPr>
             <a:xfrm>
-              <a:off x="10170367" y="4382784"/>
-              <a:ext cx="2021633" cy="105240"/>
+              <a:off x="8883652" y="4382784"/>
+              <a:ext cx="1317624" cy="105240"/>
             </a:xfrm>
             <a:prstGeom prst="rect">
               <a:avLst/>
@@ -3797,8 +3802,8 @@
           </p:nvSpPr>
           <p:spPr>
             <a:xfrm>
-              <a:off x="8959850" y="4382784"/>
-              <a:ext cx="1210517" cy="105240"/>
+              <a:off x="8102601" y="4382784"/>
+              <a:ext cx="781050" cy="105240"/>
             </a:xfrm>
             <a:prstGeom prst="rect">
               <a:avLst/>
@@ -3849,8 +3854,8 @@
           </p:nvSpPr>
           <p:spPr>
             <a:xfrm>
-              <a:off x="8229600" y="4382784"/>
-              <a:ext cx="730250" cy="105240"/>
+              <a:off x="7518400" y="4382784"/>
+              <a:ext cx="584200" cy="105240"/>
             </a:xfrm>
             <a:prstGeom prst="rect">
               <a:avLst/>
@@ -3901,8 +3906,8 @@
           </p:nvSpPr>
           <p:spPr>
             <a:xfrm>
-              <a:off x="7829550" y="4382784"/>
-              <a:ext cx="400050" cy="105240"/>
+              <a:off x="7239000" y="4382784"/>
+              <a:ext cx="279400" cy="105240"/>
             </a:xfrm>
             <a:prstGeom prst="rect">
               <a:avLst/>
@@ -3953,8 +3958,8 @@
           </p:nvSpPr>
           <p:spPr>
             <a:xfrm>
-              <a:off x="9805606" y="3746589"/>
-              <a:ext cx="2081147" cy="461665"/>
+              <a:off x="9307008" y="3746589"/>
+              <a:ext cx="2579745" cy="461665"/>
             </a:xfrm>
             <a:prstGeom prst="rect">
               <a:avLst/>
@@ -3966,30 +3971,6 @@
               <a:spAutoFit/>
             </a:bodyPr>
             <a:lstStyle/>
-            <a:p>
-              <a:pPr algn="r"/>
-              <a:r>
-                <a:rPr lang="en-US" altLang="ko-KR" sz="1200" b="1" dirty="0">
-                  <a:solidFill>
-                    <a:srgbClr val="CD2355"/>
-                  </a:solidFill>
-                </a:rPr>
-                <a:t>Raspberry Pi</a:t>
-              </a:r>
-              <a:r>
-                <a:rPr lang="en-US" altLang="ko-KR" sz="1200" dirty="0">
-                  <a:solidFill>
-                    <a:srgbClr val="20262D"/>
-                  </a:solidFill>
-                </a:rPr>
-                <a:t> Based</a:t>
-              </a:r>
-              <a:endParaRPr lang="ko-KR" altLang="en-US" sz="1200" dirty="0">
-                <a:solidFill>
-                  <a:srgbClr val="20262D"/>
-                </a:solidFill>
-              </a:endParaRPr>
-            </a:p>
             <a:p>
               <a:pPr algn="r"/>
               <a:r>
@@ -4015,6 +3996,41 @@
               <a:r>
                 <a:rPr lang="en-US" altLang="ko-KR" sz="1200" dirty="0"/>
                 <a:t> Practice</a:t>
+              </a:r>
+            </a:p>
+            <a:p>
+              <a:pPr algn="r"/>
+              <a:r>
+                <a:rPr lang="en-US" altLang="ko-KR" sz="1200" dirty="0">
+                  <a:solidFill>
+                    <a:srgbClr val="20262D"/>
+                  </a:solidFill>
+                </a:rPr>
+                <a:t>Based on </a:t>
+              </a:r>
+              <a:r>
+                <a:rPr lang="en-US" altLang="ko-KR" sz="1200" b="1" dirty="0">
+                  <a:solidFill>
+                    <a:srgbClr val="CD2355"/>
+                  </a:solidFill>
+                </a:rPr>
+                <a:t>Raspberry Pi</a:t>
+              </a:r>
+              <a:r>
+                <a:rPr lang="en-US" altLang="ko-KR" sz="1200" dirty="0">
+                  <a:solidFill>
+                    <a:srgbClr val="20262D"/>
+                  </a:solidFill>
+                </a:rPr>
+                <a:t> &amp; </a:t>
+              </a:r>
+              <a:r>
+                <a:rPr lang="en-US" altLang="ko-KR" sz="1200" b="1" dirty="0">
+                  <a:solidFill>
+                    <a:srgbClr val="E95420"/>
+                  </a:solidFill>
+                </a:rPr>
+                <a:t>Ubuntu</a:t>
               </a:r>
             </a:p>
           </p:txBody>
@@ -4048,14 +4064,66 @@
           </p:blipFill>
           <p:spPr>
             <a:xfrm>
-              <a:off x="67122" y="1824249"/>
-              <a:ext cx="5190678" cy="2558535"/>
+              <a:off x="372359" y="2539306"/>
+              <a:ext cx="3385909" cy="1668948"/>
             </a:xfrm>
             <a:prstGeom prst="rect">
               <a:avLst/>
             </a:prstGeom>
           </p:spPr>
         </p:pic>
+        <p:sp>
+          <p:nvSpPr>
+            <p:cNvPr id="8" name="직사각형 7">
+              <a:extLst>
+                <a:ext uri="{FF2B5EF4-FFF2-40B4-BE49-F238E27FC236}">
+                  <a16:creationId xmlns:a16="http://schemas.microsoft.com/office/drawing/2014/main" id="{4F60B9BE-A71C-0BB4-7202-AD874E2827FE}"/>
+                </a:ext>
+              </a:extLst>
+            </p:cNvPr>
+            <p:cNvSpPr/>
+            <p:nvPr/>
+          </p:nvSpPr>
+          <p:spPr>
+            <a:xfrm>
+              <a:off x="10201276" y="4382784"/>
+              <a:ext cx="1990724" cy="105240"/>
+            </a:xfrm>
+            <a:prstGeom prst="rect">
+              <a:avLst/>
+            </a:prstGeom>
+            <a:solidFill>
+              <a:srgbClr val="E95420"/>
+            </a:solidFill>
+            <a:ln>
+              <a:noFill/>
+            </a:ln>
+          </p:spPr>
+          <p:style>
+            <a:lnRef idx="2">
+              <a:schemeClr val="accent1">
+                <a:shade val="50000"/>
+              </a:schemeClr>
+            </a:lnRef>
+            <a:fillRef idx="1">
+              <a:schemeClr val="accent1"/>
+            </a:fillRef>
+            <a:effectRef idx="0">
+              <a:schemeClr val="accent1"/>
+            </a:effectRef>
+            <a:fontRef idx="minor">
+              <a:schemeClr val="lt1"/>
+            </a:fontRef>
+          </p:style>
+          <p:txBody>
+            <a:bodyPr rtlCol="0" anchor="ctr"/>
+            <a:lstStyle/>
+            <a:p>
+              <a:pPr algn="ctr"/>
+              <a:endParaRPr lang="ko-KR" altLang="en-US"/>
+            </a:p>
+          </p:txBody>
+        </p:sp>
       </p:grpSp>
     </p:spTree>
     <p:extLst>

</xml_diff>

<commit_message>
mod readme (badge, banner + docker)
</commit_message>
<xml_diff>
--- a/assets/banner-design.pptx
+++ b/assets/banner-design.pptx
@@ -3757,7 +3757,7 @@
               <a:avLst/>
             </a:prstGeom>
             <a:solidFill>
-              <a:srgbClr val="FCC153"/>
+              <a:srgbClr val="E95420"/>
             </a:solidFill>
             <a:ln>
               <a:noFill/>
@@ -3809,7 +3809,7 @@
               <a:avLst/>
             </a:prstGeom>
             <a:solidFill>
-              <a:srgbClr val="6BC148"/>
+              <a:srgbClr val="CD2355"/>
             </a:solidFill>
             <a:ln>
               <a:noFill/>
@@ -3861,7 +3861,7 @@
               <a:avLst/>
             </a:prstGeom>
             <a:solidFill>
-              <a:srgbClr val="20262D"/>
+              <a:srgbClr val="2496ED"/>
             </a:solidFill>
             <a:ln>
               <a:noFill/>
@@ -3913,7 +3913,7 @@
               <a:avLst/>
             </a:prstGeom>
             <a:solidFill>
-              <a:srgbClr val="CD2355"/>
+              <a:srgbClr val="6BC148"/>
             </a:solidFill>
             <a:ln>
               <a:noFill/>
@@ -3958,8 +3958,8 @@
           </p:nvSpPr>
           <p:spPr>
             <a:xfrm>
-              <a:off x="9307008" y="3746589"/>
-              <a:ext cx="2579745" cy="461665"/>
+              <a:off x="8528781" y="3746589"/>
+              <a:ext cx="3357972" cy="461665"/>
             </a:xfrm>
             <a:prstGeom prst="rect">
               <a:avLst/>
@@ -3995,7 +3995,7 @@
               </a:r>
               <a:r>
                 <a:rPr lang="en-US" altLang="ko-KR" sz="1200" dirty="0"/>
-                <a:t> Practice</a:t>
+                <a:t> Practice Image</a:t>
               </a:r>
             </a:p>
             <a:p>
@@ -4031,6 +4031,18 @@
                   </a:solidFill>
                 </a:rPr>
                 <a:t>Ubuntu</a:t>
+              </a:r>
+              <a:r>
+                <a:rPr lang="en-US" altLang="ko-KR" sz="1200" dirty="0"/>
+                <a:t> &amp; </a:t>
+              </a:r>
+              <a:r>
+                <a:rPr lang="en-US" altLang="ko-KR" sz="1200" b="1" dirty="0">
+                  <a:solidFill>
+                    <a:srgbClr val="2496ED"/>
+                  </a:solidFill>
+                </a:rPr>
+                <a:t>Docker</a:t>
               </a:r>
             </a:p>
           </p:txBody>
@@ -4093,7 +4105,7 @@
               <a:avLst/>
             </a:prstGeom>
             <a:solidFill>
-              <a:srgbClr val="E95420"/>
+              <a:srgbClr val="FCC153"/>
             </a:solidFill>
             <a:ln>
               <a:noFill/>

</xml_diff>